<commit_message>
updated excel II to include all IBNR
</commit_message>
<xml_diff>
--- a/projects/BASWorkshops/Excel_II/Excel_II_Slides.pptx
+++ b/projects/BASWorkshops/Excel_II/Excel_II_Slides.pptx
@@ -271,7 +271,7 @@
           <a:p>
             <a:fld id="{69DB98C1-AF1F-4BA8-AAB2-77F73848AE15}" type="datetimeFigureOut">
               <a:rPr lang="en-US" smtClean="0"/>
-              <a:t>7/29/2018</a:t>
+              <a:t>9/11/2018</a:t>
             </a:fld>
             <a:endParaRPr lang="en-US"/>
           </a:p>
@@ -469,7 +469,7 @@
           <a:p>
             <a:fld id="{69DB98C1-AF1F-4BA8-AAB2-77F73848AE15}" type="datetimeFigureOut">
               <a:rPr lang="en-US" smtClean="0"/>
-              <a:t>7/29/2018</a:t>
+              <a:t>9/11/2018</a:t>
             </a:fld>
             <a:endParaRPr lang="en-US"/>
           </a:p>
@@ -677,7 +677,7 @@
           <a:p>
             <a:fld id="{69DB98C1-AF1F-4BA8-AAB2-77F73848AE15}" type="datetimeFigureOut">
               <a:rPr lang="en-US" smtClean="0"/>
-              <a:t>7/29/2018</a:t>
+              <a:t>9/11/2018</a:t>
             </a:fld>
             <a:endParaRPr lang="en-US"/>
           </a:p>
@@ -875,7 +875,7 @@
           <a:p>
             <a:fld id="{69DB98C1-AF1F-4BA8-AAB2-77F73848AE15}" type="datetimeFigureOut">
               <a:rPr lang="en-US" smtClean="0"/>
-              <a:t>7/29/2018</a:t>
+              <a:t>9/11/2018</a:t>
             </a:fld>
             <a:endParaRPr lang="en-US"/>
           </a:p>
@@ -1150,7 +1150,7 @@
           <a:p>
             <a:fld id="{69DB98C1-AF1F-4BA8-AAB2-77F73848AE15}" type="datetimeFigureOut">
               <a:rPr lang="en-US" smtClean="0"/>
-              <a:t>7/29/2018</a:t>
+              <a:t>9/11/2018</a:t>
             </a:fld>
             <a:endParaRPr lang="en-US"/>
           </a:p>
@@ -1415,7 +1415,7 @@
           <a:p>
             <a:fld id="{69DB98C1-AF1F-4BA8-AAB2-77F73848AE15}" type="datetimeFigureOut">
               <a:rPr lang="en-US" smtClean="0"/>
-              <a:t>7/29/2018</a:t>
+              <a:t>9/11/2018</a:t>
             </a:fld>
             <a:endParaRPr lang="en-US"/>
           </a:p>
@@ -1827,7 +1827,7 @@
           <a:p>
             <a:fld id="{69DB98C1-AF1F-4BA8-AAB2-77F73848AE15}" type="datetimeFigureOut">
               <a:rPr lang="en-US" smtClean="0"/>
-              <a:t>7/29/2018</a:t>
+              <a:t>9/11/2018</a:t>
             </a:fld>
             <a:endParaRPr lang="en-US"/>
           </a:p>
@@ -1968,7 +1968,7 @@
           <a:p>
             <a:fld id="{69DB98C1-AF1F-4BA8-AAB2-77F73848AE15}" type="datetimeFigureOut">
               <a:rPr lang="en-US" smtClean="0"/>
-              <a:t>7/29/2018</a:t>
+              <a:t>9/11/2018</a:t>
             </a:fld>
             <a:endParaRPr lang="en-US"/>
           </a:p>
@@ -2081,7 +2081,7 @@
           <a:p>
             <a:fld id="{69DB98C1-AF1F-4BA8-AAB2-77F73848AE15}" type="datetimeFigureOut">
               <a:rPr lang="en-US" smtClean="0"/>
-              <a:t>7/29/2018</a:t>
+              <a:t>9/11/2018</a:t>
             </a:fld>
             <a:endParaRPr lang="en-US"/>
           </a:p>
@@ -2392,7 +2392,7 @@
           <a:p>
             <a:fld id="{69DB98C1-AF1F-4BA8-AAB2-77F73848AE15}" type="datetimeFigureOut">
               <a:rPr lang="en-US" smtClean="0"/>
-              <a:t>7/29/2018</a:t>
+              <a:t>9/11/2018</a:t>
             </a:fld>
             <a:endParaRPr lang="en-US"/>
           </a:p>
@@ -2680,7 +2680,7 @@
           <a:p>
             <a:fld id="{69DB98C1-AF1F-4BA8-AAB2-77F73848AE15}" type="datetimeFigureOut">
               <a:rPr lang="en-US" smtClean="0"/>
-              <a:t>7/29/2018</a:t>
+              <a:t>9/11/2018</a:t>
             </a:fld>
             <a:endParaRPr lang="en-US"/>
           </a:p>
@@ -2921,7 +2921,7 @@
           <a:p>
             <a:fld id="{69DB98C1-AF1F-4BA8-AAB2-77F73848AE15}" type="datetimeFigureOut">
               <a:rPr lang="en-US" smtClean="0"/>
-              <a:t>7/29/2018</a:t>
+              <a:t>9/11/2018</a:t>
             </a:fld>
             <a:endParaRPr lang="en-US"/>
           </a:p>
@@ -4186,7 +4186,7 @@
           <a:p>
             <a:r>
               <a:rPr lang="en-US" dirty="0"/>
-              <a:t>It is January 1st, 2019. The reserving team in the actuarial department has set aside a reserve of $7M to pay for losses occurring before 2019 reported in 2019.</a:t>
+              <a:t>It is January 1st, 2019. The reserving team in the actuarial department has set aside a pure IBNR reserve of $7M to pay for losses occurring before 2019 reported in 2019.</a:t>
             </a:r>
           </a:p>
           <a:p>

</xml_diff>